<commit_message>
Deployed 3eff3fd4 with MkDocs version: 1.1.2
</commit_message>
<xml_diff>
--- a/presentations/Physical-Computing.pptx
+++ b/presentations/Physical-Computing.pptx
@@ -6,6 +6,8 @@
   </p:sldMasterIdLst>
   <p:sldIdLst>
     <p:sldId id="256" r:id="rId2"/>
+    <p:sldId id="257" r:id="rId3"/>
+    <p:sldId id="258" r:id="rId4"/>
   </p:sldIdLst>
   <p:sldSz cx="12192000" cy="6858000"/>
   <p:notesSz cx="6858000" cy="9144000"/>
@@ -3342,32 +3344,73 @@
           <a:bodyPr/>
           <a:lstStyle/>
           <a:p>
+            <a:r>
+              <a:rPr lang="en-US" dirty="0"/>
+              <a:t>Physical Computing</a:t>
+            </a:r>
+          </a:p>
+        </p:txBody>
+      </p:sp>
+      <p:sp>
+        <p:nvSpPr>
+          <p:cNvPr id="3" name="Subtitle 2">
+            <a:extLst>
+              <a:ext uri="{FF2B5EF4-FFF2-40B4-BE49-F238E27FC236}">
+                <a16:creationId xmlns:a16="http://schemas.microsoft.com/office/drawing/2014/main" id="{4C17A686-C4A6-E341-9CE7-5417F4C69E12}"/>
+              </a:ext>
+            </a:extLst>
+          </p:cNvPr>
+          <p:cNvSpPr>
+            <a:spLocks noGrp="1"/>
+          </p:cNvSpPr>
+          <p:nvPr>
+            <p:ph type="subTitle" idx="1"/>
+          </p:nvPr>
+        </p:nvSpPr>
+        <p:spPr/>
+        <p:txBody>
+          <a:bodyPr/>
+          <a:lstStyle/>
+          <a:p>
             <a:endParaRPr lang="en-US"/>
           </a:p>
         </p:txBody>
       </p:sp>
       <p:sp>
         <p:nvSpPr>
-          <p:cNvPr id="3" name="Subtitle 2">
-            <a:extLst>
-              <a:ext uri="{FF2B5EF4-FFF2-40B4-BE49-F238E27FC236}">
-                <a16:creationId xmlns:a16="http://schemas.microsoft.com/office/drawing/2014/main" id="{4C17A686-C4A6-E341-9CE7-5417F4C69E12}"/>
-              </a:ext>
-            </a:extLst>
-          </p:cNvPr>
-          <p:cNvSpPr>
-            <a:spLocks noGrp="1"/>
-          </p:cNvSpPr>
-          <p:nvPr>
-            <p:ph type="subTitle" idx="1"/>
-          </p:nvPr>
-        </p:nvSpPr>
-        <p:spPr/>
-        <p:txBody>
-          <a:bodyPr/>
-          <a:lstStyle/>
-          <a:p>
-            <a:endParaRPr lang="en-US"/>
+          <p:cNvPr id="5" name="TextBox 4">
+            <a:extLst>
+              <a:ext uri="{FF2B5EF4-FFF2-40B4-BE49-F238E27FC236}">
+                <a16:creationId xmlns:a16="http://schemas.microsoft.com/office/drawing/2014/main" id="{D3825E5D-617A-234F-9510-A0329346C677}"/>
+              </a:ext>
+            </a:extLst>
+          </p:cNvPr>
+          <p:cNvSpPr txBox="1"/>
+          <p:nvPr/>
+        </p:nvSpPr>
+        <p:spPr>
+          <a:xfrm>
+            <a:off x="3048000" y="3244334"/>
+            <a:ext cx="6096000" cy="369332"/>
+          </a:xfrm>
+          <a:prstGeom prst="rect">
+            <a:avLst/>
+          </a:prstGeom>
+          <a:noFill/>
+        </p:spPr>
+        <p:txBody>
+          <a:bodyPr wrap="square">
+            <a:spAutoFit/>
+          </a:bodyPr>
+          <a:lstStyle/>
+          <a:p>
+            <a:r>
+              <a:rPr lang="en-US" b="0" dirty="0">
+                <a:effectLst/>
+              </a:rPr>
+              <a:t> </a:t>
+            </a:r>
+            <a:endParaRPr lang="en-US" dirty="0"/>
           </a:p>
         </p:txBody>
       </p:sp>
@@ -3375,6 +3418,644 @@
     <p:extLst>
       <p:ext uri="{BB962C8B-B14F-4D97-AF65-F5344CB8AC3E}">
         <p14:creationId xmlns:p14="http://schemas.microsoft.com/office/powerpoint/2010/main" val="3878828568"/>
+      </p:ext>
+    </p:extLst>
+  </p:cSld>
+  <p:clrMapOvr>
+    <a:masterClrMapping/>
+  </p:clrMapOvr>
+</p:sld>
+</file>
+
+<file path=ppt/slides/slide2.xml><?xml version="1.0" encoding="utf-8"?>
+<p:sld xmlns:a="http://schemas.openxmlformats.org/drawingml/2006/main" xmlns:r="http://schemas.openxmlformats.org/officeDocument/2006/relationships" xmlns:p="http://schemas.openxmlformats.org/presentationml/2006/main">
+  <p:cSld>
+    <p:spTree>
+      <p:nvGrpSpPr>
+        <p:cNvPr id="1" name=""/>
+        <p:cNvGrpSpPr/>
+        <p:nvPr/>
+      </p:nvGrpSpPr>
+      <p:grpSpPr>
+        <a:xfrm>
+          <a:off x="0" y="0"/>
+          <a:ext cx="0" cy="0"/>
+          <a:chOff x="0" y="0"/>
+          <a:chExt cx="0" cy="0"/>
+        </a:xfrm>
+      </p:grpSpPr>
+      <p:sp>
+        <p:nvSpPr>
+          <p:cNvPr id="2" name="Title 1">
+            <a:extLst>
+              <a:ext uri="{FF2B5EF4-FFF2-40B4-BE49-F238E27FC236}">
+                <a16:creationId xmlns:a16="http://schemas.microsoft.com/office/drawing/2014/main" id="{366C393E-9582-F641-84BB-E6498083293E}"/>
+              </a:ext>
+            </a:extLst>
+          </p:cNvPr>
+          <p:cNvSpPr>
+            <a:spLocks noGrp="1"/>
+          </p:cNvSpPr>
+          <p:nvPr>
+            <p:ph type="title"/>
+          </p:nvPr>
+        </p:nvSpPr>
+        <p:spPr/>
+        <p:txBody>
+          <a:bodyPr/>
+          <a:lstStyle/>
+          <a:p>
+            <a:r>
+              <a:rPr lang="en-US" dirty="0"/>
+              <a:t>What is Physical Computing?</a:t>
+            </a:r>
+          </a:p>
+        </p:txBody>
+      </p:sp>
+      <p:sp>
+        <p:nvSpPr>
+          <p:cNvPr id="3" name="Content Placeholder 2">
+            <a:extLst>
+              <a:ext uri="{FF2B5EF4-FFF2-40B4-BE49-F238E27FC236}">
+                <a16:creationId xmlns:a16="http://schemas.microsoft.com/office/drawing/2014/main" id="{D1EC3AEC-F48F-8041-945D-E24B3B54D184}"/>
+              </a:ext>
+            </a:extLst>
+          </p:cNvPr>
+          <p:cNvSpPr>
+            <a:spLocks noGrp="1"/>
+          </p:cNvSpPr>
+          <p:nvPr>
+            <p:ph idx="1"/>
+          </p:nvPr>
+        </p:nvSpPr>
+        <p:spPr>
+          <a:xfrm>
+            <a:off x="838200" y="5486399"/>
+            <a:ext cx="10515600" cy="690563"/>
+          </a:xfrm>
+        </p:spPr>
+        <p:txBody>
+          <a:bodyPr>
+            <a:normAutofit fontScale="92500" lnSpcReduction="20000"/>
+          </a:bodyPr>
+          <a:lstStyle/>
+          <a:p>
+            <a:r>
+              <a:rPr lang="en-US" b="1" dirty="0"/>
+              <a:t>Physical computing</a:t>
+            </a:r>
+            <a:r>
+              <a:rPr lang="en-US" dirty="0"/>
+              <a:t> involves interactive systems that can sense and respond to the world around them.</a:t>
+            </a:r>
+          </a:p>
+        </p:txBody>
+      </p:sp>
+      <p:pic>
+        <p:nvPicPr>
+          <p:cNvPr id="1026" name="Picture 2">
+            <a:extLst>
+              <a:ext uri="{FF2B5EF4-FFF2-40B4-BE49-F238E27FC236}">
+                <a16:creationId xmlns:a16="http://schemas.microsoft.com/office/drawing/2014/main" id="{91E5E15C-2CB1-CA44-AFEC-1521A2FBE72C}"/>
+              </a:ext>
+            </a:extLst>
+          </p:cNvPr>
+          <p:cNvPicPr>
+            <a:picLocks noChangeAspect="1" noChangeArrowheads="1"/>
+          </p:cNvPicPr>
+          <p:nvPr/>
+        </p:nvPicPr>
+        <p:blipFill>
+          <a:blip r:embed="rId2">
+            <a:extLst>
+              <a:ext uri="{28A0092B-C50C-407E-A947-70E740481C1C}">
+                <a14:useLocalDpi xmlns:a14="http://schemas.microsoft.com/office/drawing/2010/main" val="0"/>
+              </a:ext>
+            </a:extLst>
+          </a:blip>
+          <a:srcRect/>
+          <a:stretch>
+            <a:fillRect/>
+          </a:stretch>
+        </p:blipFill>
+        <p:spPr bwMode="auto">
+          <a:xfrm>
+            <a:off x="850900" y="1625600"/>
+            <a:ext cx="10490200" cy="3606800"/>
+          </a:xfrm>
+          <a:prstGeom prst="rect">
+            <a:avLst/>
+          </a:prstGeom>
+          <a:noFill/>
+          <a:extLst>
+            <a:ext uri="{909E8E84-426E-40DD-AFC4-6F175D3DCCD1}">
+              <a14:hiddenFill xmlns:a14="http://schemas.microsoft.com/office/drawing/2010/main">
+                <a:solidFill>
+                  <a:srgbClr val="FFFFFF"/>
+                </a:solidFill>
+              </a14:hiddenFill>
+            </a:ext>
+          </a:extLst>
+        </p:spPr>
+      </p:pic>
+    </p:spTree>
+    <p:extLst>
+      <p:ext uri="{BB962C8B-B14F-4D97-AF65-F5344CB8AC3E}">
+        <p14:creationId xmlns:p14="http://schemas.microsoft.com/office/powerpoint/2010/main" val="3000609260"/>
+      </p:ext>
+    </p:extLst>
+  </p:cSld>
+  <p:clrMapOvr>
+    <a:masterClrMapping/>
+  </p:clrMapOvr>
+</p:sld>
+</file>
+
+<file path=ppt/slides/slide3.xml><?xml version="1.0" encoding="utf-8"?>
+<p:sld xmlns:a="http://schemas.openxmlformats.org/drawingml/2006/main" xmlns:r="http://schemas.openxmlformats.org/officeDocument/2006/relationships" xmlns:p="http://schemas.openxmlformats.org/presentationml/2006/main">
+  <p:cSld>
+    <p:spTree>
+      <p:nvGrpSpPr>
+        <p:cNvPr id="1" name=""/>
+        <p:cNvGrpSpPr/>
+        <p:nvPr/>
+      </p:nvGrpSpPr>
+      <p:grpSpPr>
+        <a:xfrm>
+          <a:off x="0" y="0"/>
+          <a:ext cx="0" cy="0"/>
+          <a:chOff x="0" y="0"/>
+          <a:chExt cx="0" cy="0"/>
+        </a:xfrm>
+      </p:grpSpPr>
+      <p:sp>
+        <p:nvSpPr>
+          <p:cNvPr id="2" name="Title 1">
+            <a:extLst>
+              <a:ext uri="{FF2B5EF4-FFF2-40B4-BE49-F238E27FC236}">
+                <a16:creationId xmlns:a16="http://schemas.microsoft.com/office/drawing/2014/main" id="{15DDE4C0-995A-AD4C-BE5B-CDAE5D69F6C2}"/>
+              </a:ext>
+            </a:extLst>
+          </p:cNvPr>
+          <p:cNvSpPr>
+            <a:spLocks noGrp="1"/>
+          </p:cNvSpPr>
+          <p:nvPr>
+            <p:ph type="title"/>
+          </p:nvPr>
+        </p:nvSpPr>
+        <p:spPr/>
+        <p:txBody>
+          <a:bodyPr/>
+          <a:lstStyle/>
+          <a:p>
+            <a:endParaRPr lang="en-US"/>
+          </a:p>
+        </p:txBody>
+      </p:sp>
+      <p:sp>
+        <p:nvSpPr>
+          <p:cNvPr id="3" name="Content Placeholder 2">
+            <a:extLst>
+              <a:ext uri="{FF2B5EF4-FFF2-40B4-BE49-F238E27FC236}">
+                <a16:creationId xmlns:a16="http://schemas.microsoft.com/office/drawing/2014/main" id="{158932E3-5ED3-384E-BC46-3CF28215B461}"/>
+              </a:ext>
+            </a:extLst>
+          </p:cNvPr>
+          <p:cNvSpPr>
+            <a:spLocks noGrp="1"/>
+          </p:cNvSpPr>
+          <p:nvPr>
+            <p:ph idx="1"/>
+          </p:nvPr>
+        </p:nvSpPr>
+        <p:spPr>
+          <a:xfrm>
+            <a:off x="838200" y="5094513"/>
+            <a:ext cx="10515600" cy="1082449"/>
+          </a:xfrm>
+        </p:spPr>
+        <p:txBody>
+          <a:bodyPr/>
+          <a:lstStyle/>
+          <a:p>
+            <a:endParaRPr lang="en-US" dirty="0"/>
+          </a:p>
+        </p:txBody>
+      </p:sp>
+      <p:sp>
+        <p:nvSpPr>
+          <p:cNvPr id="5" name="Rounded Rectangle 4">
+            <a:extLst>
+              <a:ext uri="{FF2B5EF4-FFF2-40B4-BE49-F238E27FC236}">
+                <a16:creationId xmlns:a16="http://schemas.microsoft.com/office/drawing/2014/main" id="{78FC3DE7-6468-B94A-817D-10692DE14F09}"/>
+              </a:ext>
+            </a:extLst>
+          </p:cNvPr>
+          <p:cNvSpPr/>
+          <p:nvPr/>
+        </p:nvSpPr>
+        <p:spPr>
+          <a:xfrm>
+            <a:off x="6349940" y="2447323"/>
+            <a:ext cx="1955860" cy="1645706"/>
+          </a:xfrm>
+          <a:prstGeom prst="roundRect">
+            <a:avLst/>
+          </a:prstGeom>
+          <a:solidFill>
+            <a:schemeClr val="bg1">
+              <a:lumMod val="85000"/>
+            </a:schemeClr>
+          </a:solidFill>
+          <a:ln w="28575">
+            <a:solidFill>
+              <a:schemeClr val="tx1"/>
+            </a:solidFill>
+          </a:ln>
+        </p:spPr>
+        <p:style>
+          <a:lnRef idx="2">
+            <a:schemeClr val="accent1">
+              <a:shade val="50000"/>
+            </a:schemeClr>
+          </a:lnRef>
+          <a:fillRef idx="1">
+            <a:schemeClr val="accent1"/>
+          </a:fillRef>
+          <a:effectRef idx="0">
+            <a:schemeClr val="accent1"/>
+          </a:effectRef>
+          <a:fontRef idx="minor">
+            <a:schemeClr val="lt1"/>
+          </a:fontRef>
+        </p:style>
+        <p:txBody>
+          <a:bodyPr rtlCol="0" anchor="t"/>
+          <a:lstStyle/>
+          <a:p>
+            <a:pPr algn="ctr"/>
+            <a:r>
+              <a:rPr lang="en-US" dirty="0">
+                <a:solidFill>
+                  <a:schemeClr val="tx1"/>
+                </a:solidFill>
+              </a:rPr>
+              <a:t>Interactive</a:t>
+            </a:r>
+          </a:p>
+          <a:p>
+            <a:pPr algn="ctr"/>
+            <a:r>
+              <a:rPr lang="en-US" dirty="0">
+                <a:solidFill>
+                  <a:schemeClr val="tx1"/>
+                </a:solidFill>
+              </a:rPr>
+              <a:t>Computer</a:t>
+            </a:r>
+          </a:p>
+          <a:p>
+            <a:pPr algn="ctr"/>
+            <a:r>
+              <a:rPr lang="en-US" dirty="0">
+                <a:solidFill>
+                  <a:schemeClr val="tx1"/>
+                </a:solidFill>
+              </a:rPr>
+              <a:t>System</a:t>
+            </a:r>
+          </a:p>
+        </p:txBody>
+      </p:sp>
+      <p:sp>
+        <p:nvSpPr>
+          <p:cNvPr id="6" name="Right Arrow 5">
+            <a:extLst>
+              <a:ext uri="{FF2B5EF4-FFF2-40B4-BE49-F238E27FC236}">
+                <a16:creationId xmlns:a16="http://schemas.microsoft.com/office/drawing/2014/main" id="{7812AA5A-8245-7149-A7A1-BD34F4DF82B2}"/>
+              </a:ext>
+            </a:extLst>
+          </p:cNvPr>
+          <p:cNvSpPr/>
+          <p:nvPr/>
+        </p:nvSpPr>
+        <p:spPr>
+          <a:xfrm>
+            <a:off x="2971801" y="2460171"/>
+            <a:ext cx="3287485" cy="849086"/>
+          </a:xfrm>
+          <a:prstGeom prst="rightArrow">
+            <a:avLst/>
+          </a:prstGeom>
+          <a:solidFill>
+            <a:schemeClr val="accent4"/>
+          </a:solidFill>
+          <a:ln>
+            <a:solidFill>
+              <a:schemeClr val="tx1"/>
+            </a:solidFill>
+          </a:ln>
+        </p:spPr>
+        <p:style>
+          <a:lnRef idx="2">
+            <a:schemeClr val="accent1">
+              <a:shade val="50000"/>
+            </a:schemeClr>
+          </a:lnRef>
+          <a:fillRef idx="1">
+            <a:schemeClr val="accent1"/>
+          </a:fillRef>
+          <a:effectRef idx="0">
+            <a:schemeClr val="accent1"/>
+          </a:effectRef>
+          <a:fontRef idx="minor">
+            <a:schemeClr val="lt1"/>
+          </a:fontRef>
+        </p:style>
+        <p:txBody>
+          <a:bodyPr rtlCol="0" anchor="ctr"/>
+          <a:lstStyle/>
+          <a:p>
+            <a:pPr algn="ctr"/>
+            <a:r>
+              <a:rPr lang="en-US" dirty="0">
+                <a:solidFill>
+                  <a:schemeClr val="tx1"/>
+                </a:solidFill>
+              </a:rPr>
+              <a:t>Sensor Data (light, sound)</a:t>
+            </a:r>
+          </a:p>
+        </p:txBody>
+      </p:sp>
+      <p:sp>
+        <p:nvSpPr>
+          <p:cNvPr id="7" name="Left Arrow 6">
+            <a:extLst>
+              <a:ext uri="{FF2B5EF4-FFF2-40B4-BE49-F238E27FC236}">
+                <a16:creationId xmlns:a16="http://schemas.microsoft.com/office/drawing/2014/main" id="{AE2A89EE-323D-BA4C-9381-9291DD60C917}"/>
+              </a:ext>
+            </a:extLst>
+          </p:cNvPr>
+          <p:cNvSpPr/>
+          <p:nvPr/>
+        </p:nvSpPr>
+        <p:spPr>
+          <a:xfrm>
+            <a:off x="2906486" y="3222171"/>
+            <a:ext cx="3200400" cy="751113"/>
+          </a:xfrm>
+          <a:prstGeom prst="leftArrow">
+            <a:avLst/>
+          </a:prstGeom>
+        </p:spPr>
+        <p:style>
+          <a:lnRef idx="2">
+            <a:schemeClr val="accent1">
+              <a:shade val="50000"/>
+            </a:schemeClr>
+          </a:lnRef>
+          <a:fillRef idx="1">
+            <a:schemeClr val="accent1"/>
+          </a:fillRef>
+          <a:effectRef idx="0">
+            <a:schemeClr val="accent1"/>
+          </a:effectRef>
+          <a:fontRef idx="minor">
+            <a:schemeClr val="lt1"/>
+          </a:fontRef>
+        </p:style>
+        <p:txBody>
+          <a:bodyPr rtlCol="0" anchor="ctr"/>
+          <a:lstStyle/>
+          <a:p>
+            <a:pPr algn="ctr"/>
+            <a:r>
+              <a:rPr lang="en-US" dirty="0"/>
+              <a:t>Actuators: (displays, motors)</a:t>
+            </a:r>
+          </a:p>
+        </p:txBody>
+      </p:sp>
+      <p:pic>
+        <p:nvPicPr>
+          <p:cNvPr id="9" name="Picture 8">
+            <a:extLst>
+              <a:ext uri="{FF2B5EF4-FFF2-40B4-BE49-F238E27FC236}">
+                <a16:creationId xmlns:a16="http://schemas.microsoft.com/office/drawing/2014/main" id="{BF858B27-7B33-0548-8EF2-29EA63818724}"/>
+              </a:ext>
+            </a:extLst>
+          </p:cNvPr>
+          <p:cNvPicPr>
+            <a:picLocks noChangeAspect="1"/>
+          </p:cNvPicPr>
+          <p:nvPr/>
+        </p:nvPicPr>
+        <p:blipFill>
+          <a:blip r:embed="rId2"/>
+          <a:stretch>
+            <a:fillRect/>
+          </a:stretch>
+        </p:blipFill>
+        <p:spPr>
+          <a:xfrm>
+            <a:off x="7052129" y="3429001"/>
+            <a:ext cx="528319" cy="522513"/>
+          </a:xfrm>
+          <a:prstGeom prst="rect">
+            <a:avLst/>
+          </a:prstGeom>
+          <a:ln w="9525">
+            <a:solidFill>
+              <a:schemeClr val="tx1"/>
+            </a:solidFill>
+          </a:ln>
+        </p:spPr>
+      </p:pic>
+      <p:grpSp>
+        <p:nvGrpSpPr>
+          <p:cNvPr id="11" name="Group 10">
+            <a:extLst>
+              <a:ext uri="{FF2B5EF4-FFF2-40B4-BE49-F238E27FC236}">
+                <a16:creationId xmlns:a16="http://schemas.microsoft.com/office/drawing/2014/main" id="{B7F33202-AE99-BE49-8239-B9BCE8C37C1B}"/>
+              </a:ext>
+            </a:extLst>
+          </p:cNvPr>
+          <p:cNvGrpSpPr/>
+          <p:nvPr/>
+        </p:nvGrpSpPr>
+        <p:grpSpPr>
+          <a:xfrm>
+            <a:off x="1494913" y="2458209"/>
+            <a:ext cx="1302716" cy="1569505"/>
+            <a:chOff x="1494913" y="2458209"/>
+            <a:chExt cx="1302716" cy="1569505"/>
+          </a:xfrm>
+        </p:grpSpPr>
+        <p:sp>
+          <p:nvSpPr>
+            <p:cNvPr id="4" name="Rounded Rectangle 3">
+              <a:extLst>
+                <a:ext uri="{FF2B5EF4-FFF2-40B4-BE49-F238E27FC236}">
+                  <a16:creationId xmlns:a16="http://schemas.microsoft.com/office/drawing/2014/main" id="{39CA12F4-D656-F049-B6C5-B9F0CEFAADA6}"/>
+                </a:ext>
+              </a:extLst>
+            </p:cNvPr>
+            <p:cNvSpPr/>
+            <p:nvPr/>
+          </p:nvSpPr>
+          <p:spPr>
+            <a:xfrm>
+              <a:off x="1494913" y="2458209"/>
+              <a:ext cx="1302716" cy="1569505"/>
+            </a:xfrm>
+            <a:prstGeom prst="roundRect">
+              <a:avLst/>
+            </a:prstGeom>
+            <a:solidFill>
+              <a:schemeClr val="bg1">
+                <a:lumMod val="85000"/>
+              </a:schemeClr>
+            </a:solidFill>
+            <a:ln w="28575">
+              <a:solidFill>
+                <a:schemeClr val="tx1"/>
+              </a:solidFill>
+            </a:ln>
+          </p:spPr>
+          <p:style>
+            <a:lnRef idx="2">
+              <a:schemeClr val="accent1">
+                <a:shade val="50000"/>
+              </a:schemeClr>
+            </a:lnRef>
+            <a:fillRef idx="1">
+              <a:schemeClr val="accent1"/>
+            </a:fillRef>
+            <a:effectRef idx="0">
+              <a:schemeClr val="accent1"/>
+            </a:effectRef>
+            <a:fontRef idx="minor">
+              <a:schemeClr val="lt1"/>
+            </a:fontRef>
+          </p:style>
+          <p:txBody>
+            <a:bodyPr rtlCol="0" anchor="t"/>
+            <a:lstStyle/>
+            <a:p>
+              <a:pPr algn="ctr"/>
+              <a:r>
+                <a:rPr lang="en-US" dirty="0">
+                  <a:solidFill>
+                    <a:schemeClr val="tx1"/>
+                  </a:solidFill>
+                </a:rPr>
+                <a:t>The Real World</a:t>
+              </a:r>
+            </a:p>
+          </p:txBody>
+        </p:sp>
+        <p:pic>
+          <p:nvPicPr>
+            <p:cNvPr id="8" name="Picture 7">
+              <a:extLst>
+                <a:ext uri="{FF2B5EF4-FFF2-40B4-BE49-F238E27FC236}">
+                  <a16:creationId xmlns:a16="http://schemas.microsoft.com/office/drawing/2014/main" id="{C12146BB-5C99-DD46-AB54-4E35A72AB50D}"/>
+                </a:ext>
+              </a:extLst>
+            </p:cNvPr>
+            <p:cNvPicPr>
+              <a:picLocks noChangeAspect="1"/>
+            </p:cNvPicPr>
+            <p:nvPr/>
+          </p:nvPicPr>
+          <p:blipFill>
+            <a:blip r:embed="rId3">
+              <a:clrChange>
+                <a:clrFrom>
+                  <a:srgbClr val="F7F7F7"/>
+                </a:clrFrom>
+                <a:clrTo>
+                  <a:srgbClr val="F7F7F7">
+                    <a:alpha val="0"/>
+                  </a:srgbClr>
+                </a:clrTo>
+              </a:clrChange>
+            </a:blip>
+            <a:stretch>
+              <a:fillRect/>
+            </a:stretch>
+          </p:blipFill>
+          <p:spPr>
+            <a:xfrm>
+              <a:off x="1709510" y="3128866"/>
+              <a:ext cx="819150" cy="754611"/>
+            </a:xfrm>
+            <a:prstGeom prst="rect">
+              <a:avLst/>
+            </a:prstGeom>
+          </p:spPr>
+        </p:pic>
+        <p:sp>
+          <p:nvSpPr>
+            <p:cNvPr id="10" name="Rectangle 9">
+              <a:extLst>
+                <a:ext uri="{FF2B5EF4-FFF2-40B4-BE49-F238E27FC236}">
+                  <a16:creationId xmlns:a16="http://schemas.microsoft.com/office/drawing/2014/main" id="{7414A0E6-276A-2246-AFA9-3DC02E1D2E3C}"/>
+                </a:ext>
+              </a:extLst>
+            </p:cNvPr>
+            <p:cNvSpPr/>
+            <p:nvPr/>
+          </p:nvSpPr>
+          <p:spPr>
+            <a:xfrm>
+              <a:off x="1647825" y="3781425"/>
+              <a:ext cx="212725" cy="171450"/>
+            </a:xfrm>
+            <a:prstGeom prst="rect">
+              <a:avLst/>
+            </a:prstGeom>
+            <a:solidFill>
+              <a:schemeClr val="bg1">
+                <a:lumMod val="85000"/>
+              </a:schemeClr>
+            </a:solidFill>
+            <a:ln>
+              <a:noFill/>
+            </a:ln>
+          </p:spPr>
+          <p:style>
+            <a:lnRef idx="2">
+              <a:schemeClr val="accent1">
+                <a:shade val="50000"/>
+              </a:schemeClr>
+            </a:lnRef>
+            <a:fillRef idx="1">
+              <a:schemeClr val="accent1"/>
+            </a:fillRef>
+            <a:effectRef idx="0">
+              <a:schemeClr val="accent1"/>
+            </a:effectRef>
+            <a:fontRef idx="minor">
+              <a:schemeClr val="lt1"/>
+            </a:fontRef>
+          </p:style>
+          <p:txBody>
+            <a:bodyPr rtlCol="0" anchor="ctr"/>
+            <a:lstStyle/>
+            <a:p>
+              <a:pPr algn="ctr"/>
+              <a:endParaRPr lang="en-US"/>
+            </a:p>
+          </p:txBody>
+        </p:sp>
+      </p:grpSp>
+    </p:spTree>
+    <p:extLst>
+      <p:ext uri="{BB962C8B-B14F-4D97-AF65-F5344CB8AC3E}">
+        <p14:creationId xmlns:p14="http://schemas.microsoft.com/office/powerpoint/2010/main" val="2221196674"/>
       </p:ext>
     </p:extLst>
   </p:cSld>

</xml_diff>